<commit_message>
updating presentation materials again
</commit_message>
<xml_diff>
--- a/presentation/emoMint.pptx
+++ b/presentation/emoMint.pptx
@@ -7,12 +7,11 @@
   <p:sldIdLst>
     <p:sldId id="256" r:id="rId2"/>
     <p:sldId id="257" r:id="rId3"/>
-    <p:sldId id="258" r:id="rId4"/>
-    <p:sldId id="259" r:id="rId5"/>
+    <p:sldId id="259" r:id="rId4"/>
+    <p:sldId id="262" r:id="rId5"/>
     <p:sldId id="260" r:id="rId6"/>
-    <p:sldId id="262" r:id="rId7"/>
-    <p:sldId id="261" r:id="rId8"/>
-    <p:sldId id="263" r:id="rId9"/>
+    <p:sldId id="261" r:id="rId7"/>
+    <p:sldId id="263" r:id="rId8"/>
   </p:sldIdLst>
   <p:sldSz cx="12192000" cy="6858000"/>
   <p:notesSz cx="6858000" cy="9144000"/>
@@ -111,6 +110,11 @@
       </a:defRPr>
     </a:lvl9pPr>
   </p:defaultTextStyle>
+  <p:extLst>
+    <p:ext uri="{EFAFB233-063F-42B5-8137-9DF3F51BA10A}">
+      <p15:sldGuideLst xmlns:p15="http://schemas.microsoft.com/office/powerpoint/2012/main"/>
+    </p:ext>
+  </p:extLst>
 </p:presentation>
 </file>
 
@@ -302,7 +306,7 @@
           <a:p>
             <a:fld id="{4AAD347D-5ACD-4C99-B74B-A9C85AD731AF}" type="datetimeFigureOut">
               <a:rPr lang="en-US" smtClean="0"/>
-              <a:t>8/26/16</a:t>
+              <a:t>8/27/16</a:t>
             </a:fld>
             <a:endParaRPr lang="en-US" dirty="0"/>
           </a:p>
@@ -645,7 +649,7 @@
           <a:p>
             <a:fld id="{4AAD347D-5ACD-4C99-B74B-A9C85AD731AF}" type="datetimeFigureOut">
               <a:rPr lang="en-US" smtClean="0"/>
-              <a:t>8/26/16</a:t>
+              <a:t>8/27/16</a:t>
             </a:fld>
             <a:endParaRPr lang="en-US" dirty="0"/>
           </a:p>
@@ -1047,7 +1051,7 @@
           <a:p>
             <a:fld id="{4AAD347D-5ACD-4C99-B74B-A9C85AD731AF}" type="datetimeFigureOut">
               <a:rPr lang="en-US" smtClean="0"/>
-              <a:t>8/26/16</a:t>
+              <a:t>8/27/16</a:t>
             </a:fld>
             <a:endParaRPr lang="en-US" dirty="0"/>
           </a:p>
@@ -1384,7 +1388,7 @@
           <a:p>
             <a:fld id="{4AAD347D-5ACD-4C99-B74B-A9C85AD731AF}" type="datetimeFigureOut">
               <a:rPr lang="en-US" smtClean="0"/>
-              <a:t>8/26/16</a:t>
+              <a:t>8/27/16</a:t>
             </a:fld>
             <a:endParaRPr lang="en-US" dirty="0"/>
           </a:p>
@@ -1705,7 +1709,7 @@
           <a:p>
             <a:fld id="{4AAD347D-5ACD-4C99-B74B-A9C85AD731AF}" type="datetimeFigureOut">
               <a:rPr lang="en-US" smtClean="0"/>
-              <a:t>8/26/16</a:t>
+              <a:t>8/27/16</a:t>
             </a:fld>
             <a:endParaRPr lang="en-US" dirty="0"/>
           </a:p>
@@ -2102,7 +2106,7 @@
           <a:p>
             <a:fld id="{4AAD347D-5ACD-4C99-B74B-A9C85AD731AF}" type="datetimeFigureOut">
               <a:rPr lang="en-US" smtClean="0"/>
-              <a:t>8/26/16</a:t>
+              <a:t>8/27/16</a:t>
             </a:fld>
             <a:endParaRPr lang="en-US" dirty="0"/>
           </a:p>
@@ -2360,7 +2364,7 @@
           <a:p>
             <a:fld id="{4509A250-FF31-4206-8172-F9D3106AACB1}" type="datetimeFigureOut">
               <a:rPr lang="en-US" smtClean="0"/>
-              <a:t>8/26/16</a:t>
+              <a:t>8/27/16</a:t>
             </a:fld>
             <a:endParaRPr lang="en-US" dirty="0"/>
           </a:p>
@@ -2622,7 +2626,7 @@
           <a:p>
             <a:fld id="{4509A250-FF31-4206-8172-F9D3106AACB1}" type="datetimeFigureOut">
               <a:rPr lang="en-US" smtClean="0"/>
-              <a:t>8/26/16</a:t>
+              <a:t>8/27/16</a:t>
             </a:fld>
             <a:endParaRPr lang="en-US" dirty="0"/>
           </a:p>
@@ -2889,7 +2893,7 @@
           <a:p>
             <a:fld id="{4509A250-FF31-4206-8172-F9D3106AACB1}" type="datetimeFigureOut">
               <a:rPr lang="en-US" smtClean="0"/>
-              <a:t>8/26/16</a:t>
+              <a:t>8/27/16</a:t>
             </a:fld>
             <a:endParaRPr lang="en-US" dirty="0"/>
           </a:p>
@@ -3218,7 +3222,7 @@
           <a:p>
             <a:fld id="{9796027F-7875-4030-9381-8BD8C4F21935}" type="datetimeFigureOut">
               <a:rPr lang="en-US" smtClean="0"/>
-              <a:t>8/26/16</a:t>
+              <a:t>8/27/16</a:t>
             </a:fld>
             <a:endParaRPr lang="en-US" dirty="0"/>
           </a:p>
@@ -3546,7 +3550,7 @@
           <a:p>
             <a:fld id="{9796027F-7875-4030-9381-8BD8C4F21935}" type="datetimeFigureOut">
               <a:rPr lang="en-US" smtClean="0"/>
-              <a:t>8/26/16</a:t>
+              <a:t>8/27/16</a:t>
             </a:fld>
             <a:endParaRPr lang="en-US" dirty="0"/>
           </a:p>
@@ -4003,7 +4007,7 @@
           <a:p>
             <a:fld id="{9796027F-7875-4030-9381-8BD8C4F21935}" type="datetimeFigureOut">
               <a:rPr lang="en-US" smtClean="0"/>
-              <a:t>8/26/16</a:t>
+              <a:t>8/27/16</a:t>
             </a:fld>
             <a:endParaRPr lang="en-US" dirty="0"/>
           </a:p>
@@ -4208,7 +4212,7 @@
           <a:p>
             <a:fld id="{4509A250-FF31-4206-8172-F9D3106AACB1}" type="datetimeFigureOut">
               <a:rPr lang="en-US" smtClean="0"/>
-              <a:t>8/26/16</a:t>
+              <a:t>8/27/16</a:t>
             </a:fld>
             <a:endParaRPr lang="en-US" dirty="0"/>
           </a:p>
@@ -4385,7 +4389,7 @@
           <a:p>
             <a:fld id="{4509A250-FF31-4206-8172-F9D3106AACB1}" type="datetimeFigureOut">
               <a:rPr lang="en-US" smtClean="0"/>
-              <a:t>8/26/16</a:t>
+              <a:t>8/27/16</a:t>
             </a:fld>
             <a:endParaRPr lang="en-US" dirty="0"/>
           </a:p>
@@ -4723,7 +4727,7 @@
           <a:p>
             <a:fld id="{4509A250-FF31-4206-8172-F9D3106AACB1}" type="datetimeFigureOut">
               <a:rPr lang="en-US" smtClean="0"/>
-              <a:t>8/26/16</a:t>
+              <a:t>8/27/16</a:t>
             </a:fld>
             <a:endParaRPr lang="en-US" dirty="0"/>
           </a:p>
@@ -5073,7 +5077,7 @@
           <a:p>
             <a:fld id="{4509A250-FF31-4206-8172-F9D3106AACB1}" type="datetimeFigureOut">
               <a:rPr lang="en-US" smtClean="0"/>
-              <a:t>8/26/16</a:t>
+              <a:t>8/27/16</a:t>
             </a:fld>
             <a:endParaRPr lang="en-US" dirty="0"/>
           </a:p>
@@ -7190,7 +7194,7 @@
           <a:p>
             <a:fld id="{4AAD347D-5ACD-4C99-B74B-A9C85AD731AF}" type="datetimeFigureOut">
               <a:rPr lang="en-US" smtClean="0"/>
-              <a:t>8/26/16</a:t>
+              <a:t>8/27/16</a:t>
             </a:fld>
             <a:endParaRPr lang="en-US" dirty="0"/>
           </a:p>
@@ -7857,13 +7861,13 @@
   <p:clrMapOvr>
     <a:masterClrMapping/>
   </p:clrMapOvr>
-  <mc:AlternateContent xmlns:mc="http://schemas.openxmlformats.org/markup-compatibility/2006">
-    <mc:Choice xmlns:p14="http://schemas.microsoft.com/office/powerpoint/2010/main" Requires="p14">
+  <mc:AlternateContent xmlns:mc="http://schemas.openxmlformats.org/markup-compatibility/2006" xmlns:p14="http://schemas.microsoft.com/office/powerpoint/2010/main">
+    <mc:Choice Requires="p14">
       <p:transition spd="med" p14:dur="700">
         <p:fade/>
       </p:transition>
     </mc:Choice>
-    <mc:Fallback>
+    <mc:Fallback xmlns="">
       <p:transition spd="med">
         <p:fade/>
       </p:transition>
@@ -8503,7 +8507,7 @@
         </p:spPr>
         <p:txBody>
           <a:bodyPr>
-            <a:normAutofit/>
+            <a:normAutofit lnSpcReduction="10000"/>
           </a:bodyPr>
           <a:lstStyle/>
           <a:p>
@@ -8512,9 +8516,67 @@
               <a:buChar char="•"/>
             </a:pPr>
             <a:r>
+              <a:rPr lang="en-US" sz="2800" dirty="0" smtClean="0"/>
+              <a:t>Emotions represent us, they dictate our action and impact our future.</a:t>
+            </a:r>
+          </a:p>
+          <a:p>
+            <a:pPr marL="285750" indent="-285750">
+              <a:buFont typeface="Arial" charset="0"/>
+              <a:buChar char="•"/>
+            </a:pPr>
+            <a:r>
+              <a:rPr lang="en-US" sz="2800" dirty="0" smtClean="0"/>
+              <a:t>Inspiration from powerful social media tools like Instagram, Snapchat</a:t>
+            </a:r>
+            <a:r>
               <a:rPr lang="en-US" sz="2800" dirty="0"/>
-              <a:t>Are you tire of searching to find good movies to watch or good music to listen to?</a:t>
-            </a:r>
+              <a:t> </a:t>
+            </a:r>
+            <a:r>
+              <a:rPr lang="en-US" sz="2800" dirty="0" smtClean="0"/>
+              <a:t>&amp;</a:t>
+            </a:r>
+            <a:r>
+              <a:rPr lang="en-US" sz="2800" dirty="0" smtClean="0"/>
+              <a:t> Facebook.</a:t>
+            </a:r>
+          </a:p>
+          <a:p>
+            <a:pPr marL="285750" indent="-285750">
+              <a:buFont typeface="Arial" charset="0"/>
+              <a:buChar char="•"/>
+            </a:pPr>
+            <a:r>
+              <a:rPr lang="en-US" sz="2800" dirty="0" smtClean="0"/>
+              <a:t>Your selfies are not just picture</a:t>
+            </a:r>
+            <a:r>
+              <a:rPr lang="is-IS" sz="2800" dirty="0" smtClean="0"/>
+              <a:t>… but an identifier to your emotions.</a:t>
+            </a:r>
+            <a:r>
+              <a:rPr lang="en-US" sz="2800" dirty="0" smtClean="0"/>
+              <a:t> </a:t>
+            </a:r>
+          </a:p>
+          <a:p>
+            <a:pPr marL="285750" indent="-285750">
+              <a:buFont typeface="Arial" charset="0"/>
+              <a:buChar char="•"/>
+            </a:pPr>
+            <a:r>
+              <a:rPr lang="en-US" sz="2800" dirty="0" smtClean="0"/>
+              <a:t>Are you tired of searching to find good movies to watch or good music to listen to?</a:t>
+            </a:r>
+            <a:endParaRPr lang="en-US" sz="2800" dirty="0"/>
+          </a:p>
+          <a:p>
+            <a:pPr marL="285750" indent="-285750">
+              <a:buFont typeface="Arial" charset="0"/>
+              <a:buChar char="•"/>
+            </a:pPr>
+            <a:endParaRPr lang="en-US" sz="2800" dirty="0"/>
           </a:p>
         </p:txBody>
       </p:sp>
@@ -8528,13 +8590,13 @@
   <p:clrMapOvr>
     <a:masterClrMapping/>
   </p:clrMapOvr>
-  <mc:AlternateContent xmlns:mc="http://schemas.openxmlformats.org/markup-compatibility/2006">
-    <mc:Choice xmlns:p14="http://schemas.microsoft.com/office/powerpoint/2010/main" Requires="p14">
+  <mc:AlternateContent xmlns:mc="http://schemas.openxmlformats.org/markup-compatibility/2006" xmlns:p14="http://schemas.microsoft.com/office/powerpoint/2010/main">
+    <mc:Choice Requires="p14">
       <p:transition spd="med" p14:dur="700">
         <p:fade/>
       </p:transition>
     </mc:Choice>
-    <mc:Fallback>
+    <mc:Fallback xmlns="">
       <p:transition spd="med">
         <p:fade/>
       </p:transition>
@@ -8599,7 +8661,7 @@
       </p:pic>
       <p:sp>
         <p:nvSpPr>
-          <p:cNvPr id="5" name="TextBox 4"/>
+          <p:cNvPr id="6" name="TextBox 5"/>
           <p:cNvSpPr txBox="1"/>
           <p:nvPr/>
         </p:nvSpPr>
@@ -8620,8 +8682,8 @@
           <a:lstStyle/>
           <a:p>
             <a:r>
-              <a:rPr lang="en-US" sz="4000"/>
-              <a:t>Concept</a:t>
+              <a:rPr lang="en-US" sz="4000" dirty="0" smtClean="0"/>
+              <a:t>Design</a:t>
             </a:r>
             <a:endParaRPr lang="en-US" sz="4000" dirty="0"/>
           </a:p>
@@ -8629,7 +8691,7 @@
       </p:sp>
       <p:sp>
         <p:nvSpPr>
-          <p:cNvPr id="6" name="TextBox 5"/>
+          <p:cNvPr id="7" name="TextBox 6"/>
           <p:cNvSpPr txBox="1"/>
           <p:nvPr/>
         </p:nvSpPr>
@@ -8686,35 +8748,74 @@
           </a:bodyPr>
           <a:lstStyle/>
           <a:p>
-            <a:pPr marL="285750" indent="-285750">
+            <a:pPr marL="285750" marR="0" lvl="0" indent="-285750" defTabSz="914400" eaLnBrk="1" fontAlgn="auto" latinLnBrk="0" hangingPunct="1">
+              <a:lnSpc>
+                <a:spcPct val="100000"/>
+              </a:lnSpc>
+              <a:spcBef>
+                <a:spcPts val="0"/>
+              </a:spcBef>
+              <a:spcAft>
+                <a:spcPts val="0"/>
+              </a:spcAft>
+              <a:buClrTx/>
+              <a:buSzTx/>
               <a:buFont typeface="Arial" charset="0"/>
-              <a:buChar char="•"/>
+              <a:buNone/>
+              <a:tabLst/>
+              <a:defRPr/>
             </a:pPr>
-            <a:r>
-              <a:rPr lang="en-US" sz="2800" dirty="0" smtClean="0"/>
-              <a:t>ABCD</a:t>
-            </a:r>
-            <a:endParaRPr lang="en-US" sz="2800" dirty="0"/>
-          </a:p>
-        </p:txBody>
-      </p:sp>
+            <a:endParaRPr lang="en-US" sz="2800" dirty="0" smtClean="0"/>
+          </a:p>
+        </p:txBody>
+      </p:sp>
+      <p:pic>
+        <p:nvPicPr>
+          <p:cNvPr id="9" name="Picture 8"/>
+          <p:cNvPicPr>
+            <a:picLocks noChangeAspect="1"/>
+          </p:cNvPicPr>
+          <p:nvPr/>
+        </p:nvPicPr>
+        <p:blipFill>
+          <a:blip r:embed="rId3">
+            <a:extLst>
+              <a:ext uri="{28A0092B-C50C-407E-A947-70E740481C1C}">
+                <a14:useLocalDpi xmlns:a14="http://schemas.microsoft.com/office/drawing/2010/main" val="0"/>
+              </a:ext>
+            </a:extLst>
+          </a:blip>
+          <a:stretch>
+            <a:fillRect/>
+          </a:stretch>
+        </p:blipFill>
+        <p:spPr>
+          <a:xfrm>
+            <a:off x="2406733" y="1614486"/>
+            <a:ext cx="8986751" cy="4614864"/>
+          </a:xfrm>
+          <a:prstGeom prst="rect">
+            <a:avLst/>
+          </a:prstGeom>
+        </p:spPr>
+      </p:pic>
     </p:spTree>
     <p:extLst>
       <p:ext uri="{BB962C8B-B14F-4D97-AF65-F5344CB8AC3E}">
-        <p14:creationId xmlns:p14="http://schemas.microsoft.com/office/powerpoint/2010/main" val="1609306978"/>
+        <p14:creationId xmlns:p14="http://schemas.microsoft.com/office/powerpoint/2010/main" val="1336605095"/>
       </p:ext>
     </p:extLst>
   </p:cSld>
   <p:clrMapOvr>
     <a:masterClrMapping/>
   </p:clrMapOvr>
-  <mc:AlternateContent xmlns:mc="http://schemas.openxmlformats.org/markup-compatibility/2006">
-    <mc:Choice xmlns:p14="http://schemas.microsoft.com/office/powerpoint/2010/main" Requires="p14">
+  <mc:AlternateContent xmlns:mc="http://schemas.openxmlformats.org/markup-compatibility/2006" xmlns:p14="http://schemas.microsoft.com/office/powerpoint/2010/main">
+    <mc:Choice Requires="p14">
       <p:transition spd="med" p14:dur="700">
         <p:fade/>
       </p:transition>
     </mc:Choice>
-    <mc:Fallback>
+    <mc:Fallback xmlns="">
       <p:transition spd="med">
         <p:fade/>
       </p:transition>
@@ -8747,429 +8848,6 @@
           <a:chExt cx="0" cy="0"/>
         </a:xfrm>
       </p:grpSpPr>
-      <p:pic>
-        <p:nvPicPr>
-          <p:cNvPr id="4" name="Picture 3"/>
-          <p:cNvPicPr>
-            <a:picLocks noChangeAspect="1"/>
-          </p:cNvPicPr>
-          <p:nvPr/>
-        </p:nvPicPr>
-        <p:blipFill>
-          <a:blip r:embed="rId2">
-            <a:extLst>
-              <a:ext uri="{28A0092B-C50C-407E-A947-70E740481C1C}">
-                <a14:useLocalDpi xmlns:a14="http://schemas.microsoft.com/office/drawing/2010/main" val="0"/>
-              </a:ext>
-            </a:extLst>
-          </a:blip>
-          <a:stretch>
-            <a:fillRect/>
-          </a:stretch>
-        </p:blipFill>
-        <p:spPr>
-          <a:xfrm>
-            <a:off x="9975848" y="195252"/>
-            <a:ext cx="1882777" cy="881204"/>
-          </a:xfrm>
-          <a:prstGeom prst="rect">
-            <a:avLst/>
-          </a:prstGeom>
-        </p:spPr>
-      </p:pic>
-      <p:sp>
-        <p:nvSpPr>
-          <p:cNvPr id="6" name="TextBox 5"/>
-          <p:cNvSpPr txBox="1"/>
-          <p:nvPr/>
-        </p:nvSpPr>
-        <p:spPr>
-          <a:xfrm>
-            <a:off x="1771651" y="657225"/>
-            <a:ext cx="2828924" cy="707886"/>
-          </a:xfrm>
-          <a:prstGeom prst="rect">
-            <a:avLst/>
-          </a:prstGeom>
-          <a:noFill/>
-        </p:spPr>
-        <p:txBody>
-          <a:bodyPr wrap="square" rtlCol="0">
-            <a:spAutoFit/>
-          </a:bodyPr>
-          <a:lstStyle/>
-          <a:p>
-            <a:r>
-              <a:rPr lang="en-US" sz="4000" dirty="0" smtClean="0"/>
-              <a:t>Design</a:t>
-            </a:r>
-            <a:endParaRPr lang="en-US" sz="4000" dirty="0"/>
-          </a:p>
-        </p:txBody>
-      </p:sp>
-      <p:sp>
-        <p:nvSpPr>
-          <p:cNvPr id="7" name="TextBox 6"/>
-          <p:cNvSpPr txBox="1"/>
-          <p:nvPr/>
-        </p:nvSpPr>
-        <p:spPr>
-          <a:xfrm>
-            <a:off x="2671763" y="1743074"/>
-            <a:ext cx="7129462" cy="800219"/>
-          </a:xfrm>
-          <a:prstGeom prst="rect">
-            <a:avLst/>
-          </a:prstGeom>
-          <a:noFill/>
-        </p:spPr>
-        <p:txBody>
-          <a:bodyPr wrap="square" rtlCol="0">
-            <a:spAutoFit/>
-          </a:bodyPr>
-          <a:lstStyle/>
-          <a:p>
-            <a:pPr marL="285750" indent="-285750">
-              <a:buFont typeface="Arial" charset="0"/>
-              <a:buChar char="•"/>
-            </a:pPr>
-            <a:endParaRPr lang="en-US" sz="2800" dirty="0" smtClean="0"/>
-          </a:p>
-          <a:p>
-            <a:pPr marL="285750" indent="-285750">
-              <a:buFontTx/>
-              <a:buChar char="-"/>
-            </a:pPr>
-            <a:endParaRPr lang="en-US" dirty="0"/>
-          </a:p>
-        </p:txBody>
-      </p:sp>
-      <p:sp>
-        <p:nvSpPr>
-          <p:cNvPr id="8" name="Content Placeholder 2"/>
-          <p:cNvSpPr>
-            <a:spLocks noGrp="1"/>
-          </p:cNvSpPr>
-          <p:nvPr>
-            <p:ph idx="1"/>
-          </p:nvPr>
-        </p:nvSpPr>
-        <p:spPr>
-          <a:xfrm>
-            <a:off x="2460624" y="1743074"/>
-            <a:ext cx="8915400" cy="3777622"/>
-          </a:xfrm>
-        </p:spPr>
-        <p:txBody>
-          <a:bodyPr>
-            <a:normAutofit/>
-          </a:bodyPr>
-          <a:lstStyle/>
-          <a:p>
-            <a:pPr marL="285750" indent="-285750">
-              <a:buFont typeface="Arial" charset="0"/>
-              <a:buChar char="•"/>
-            </a:pPr>
-            <a:r>
-              <a:rPr lang="en-US" sz="2800" dirty="0" smtClean="0"/>
-              <a:t>Clean </a:t>
-            </a:r>
-          </a:p>
-          <a:p>
-            <a:pPr marL="285750" indent="-285750">
-              <a:buFont typeface="Arial" charset="0"/>
-              <a:buChar char="•"/>
-            </a:pPr>
-            <a:r>
-              <a:rPr lang="en-US" sz="2800" dirty="0" smtClean="0"/>
-              <a:t>Simple</a:t>
-            </a:r>
-            <a:endParaRPr lang="en-US" sz="2800" dirty="0"/>
-          </a:p>
-        </p:txBody>
-      </p:sp>
-      <p:pic>
-        <p:nvPicPr>
-          <p:cNvPr id="9" name="Picture 8"/>
-          <p:cNvPicPr>
-            <a:picLocks noChangeAspect="1"/>
-          </p:cNvPicPr>
-          <p:nvPr/>
-        </p:nvPicPr>
-        <p:blipFill>
-          <a:blip r:embed="rId3">
-            <a:extLst>
-              <a:ext uri="{28A0092B-C50C-407E-A947-70E740481C1C}">
-                <a14:useLocalDpi xmlns:a14="http://schemas.microsoft.com/office/drawing/2010/main" val="0"/>
-              </a:ext>
-            </a:extLst>
-          </a:blip>
-          <a:stretch>
-            <a:fillRect/>
-          </a:stretch>
-        </p:blipFill>
-        <p:spPr>
-          <a:xfrm>
-            <a:off x="3186113" y="2921256"/>
-            <a:ext cx="7054852" cy="3622798"/>
-          </a:xfrm>
-          <a:prstGeom prst="rect">
-            <a:avLst/>
-          </a:prstGeom>
-        </p:spPr>
-      </p:pic>
-    </p:spTree>
-    <p:extLst>
-      <p:ext uri="{BB962C8B-B14F-4D97-AF65-F5344CB8AC3E}">
-        <p14:creationId xmlns:p14="http://schemas.microsoft.com/office/powerpoint/2010/main" val="1336605095"/>
-      </p:ext>
-    </p:extLst>
-  </p:cSld>
-  <p:clrMapOvr>
-    <a:masterClrMapping/>
-  </p:clrMapOvr>
-  <mc:AlternateContent xmlns:mc="http://schemas.openxmlformats.org/markup-compatibility/2006">
-    <mc:Choice xmlns:p14="http://schemas.microsoft.com/office/powerpoint/2010/main" Requires="p14">
-      <p:transition spd="med" p14:dur="700">
-        <p:fade/>
-      </p:transition>
-    </mc:Choice>
-    <mc:Fallback>
-      <p:transition spd="med">
-        <p:fade/>
-      </p:transition>
-    </mc:Fallback>
-  </mc:AlternateContent>
-  <p:timing>
-    <p:tnLst>
-      <p:par>
-        <p:cTn id="1" dur="indefinite" restart="never" nodeType="tmRoot"/>
-      </p:par>
-    </p:tnLst>
-  </p:timing>
-</p:sld>
-</file>
-
-<file path=ppt/slides/slide5.xml><?xml version="1.0" encoding="utf-8"?>
-<p:sld xmlns:a="http://schemas.openxmlformats.org/drawingml/2006/main" xmlns:r="http://schemas.openxmlformats.org/officeDocument/2006/relationships" xmlns:p="http://schemas.openxmlformats.org/presentationml/2006/main">
-  <p:cSld>
-    <p:spTree>
-      <p:nvGrpSpPr>
-        <p:cNvPr id="1" name=""/>
-        <p:cNvGrpSpPr/>
-        <p:nvPr/>
-      </p:nvGrpSpPr>
-      <p:grpSpPr>
-        <a:xfrm>
-          <a:off x="0" y="0"/>
-          <a:ext cx="0" cy="0"/>
-          <a:chOff x="0" y="0"/>
-          <a:chExt cx="0" cy="0"/>
-        </a:xfrm>
-      </p:grpSpPr>
-      <p:pic>
-        <p:nvPicPr>
-          <p:cNvPr id="4" name="Picture 3"/>
-          <p:cNvPicPr>
-            <a:picLocks noChangeAspect="1"/>
-          </p:cNvPicPr>
-          <p:nvPr/>
-        </p:nvPicPr>
-        <p:blipFill>
-          <a:blip r:embed="rId2">
-            <a:extLst>
-              <a:ext uri="{28A0092B-C50C-407E-A947-70E740481C1C}">
-                <a14:useLocalDpi xmlns:a14="http://schemas.microsoft.com/office/drawing/2010/main" val="0"/>
-              </a:ext>
-            </a:extLst>
-          </a:blip>
-          <a:stretch>
-            <a:fillRect/>
-          </a:stretch>
-        </p:blipFill>
-        <p:spPr>
-          <a:xfrm>
-            <a:off x="9975848" y="195252"/>
-            <a:ext cx="1882777" cy="881204"/>
-          </a:xfrm>
-          <a:prstGeom prst="rect">
-            <a:avLst/>
-          </a:prstGeom>
-        </p:spPr>
-      </p:pic>
-      <p:sp>
-        <p:nvSpPr>
-          <p:cNvPr id="5" name="TextBox 4"/>
-          <p:cNvSpPr txBox="1"/>
-          <p:nvPr/>
-        </p:nvSpPr>
-        <p:spPr>
-          <a:xfrm>
-            <a:off x="1771651" y="657225"/>
-            <a:ext cx="3857624" cy="707886"/>
-          </a:xfrm>
-          <a:prstGeom prst="rect">
-            <a:avLst/>
-          </a:prstGeom>
-          <a:noFill/>
-        </p:spPr>
-        <p:txBody>
-          <a:bodyPr wrap="square" rtlCol="0">
-            <a:spAutoFit/>
-          </a:bodyPr>
-          <a:lstStyle/>
-          <a:p>
-            <a:r>
-              <a:rPr lang="en-US" sz="4000" smtClean="0"/>
-              <a:t>Functionality</a:t>
-            </a:r>
-            <a:endParaRPr lang="en-US" sz="4000" dirty="0"/>
-          </a:p>
-        </p:txBody>
-      </p:sp>
-      <p:sp>
-        <p:nvSpPr>
-          <p:cNvPr id="6" name="TextBox 5"/>
-          <p:cNvSpPr txBox="1"/>
-          <p:nvPr/>
-        </p:nvSpPr>
-        <p:spPr>
-          <a:xfrm>
-            <a:off x="1771651" y="4978324"/>
-            <a:ext cx="3857624" cy="707886"/>
-          </a:xfrm>
-          <a:prstGeom prst="rect">
-            <a:avLst/>
-          </a:prstGeom>
-          <a:noFill/>
-        </p:spPr>
-        <p:txBody>
-          <a:bodyPr wrap="square" rtlCol="0">
-            <a:spAutoFit/>
-          </a:bodyPr>
-          <a:lstStyle/>
-          <a:p>
-            <a:r>
-              <a:rPr lang="en-US" sz="4000" dirty="0" smtClean="0"/>
-              <a:t>Demo</a:t>
-            </a:r>
-            <a:endParaRPr lang="en-US" sz="4000" dirty="0"/>
-          </a:p>
-        </p:txBody>
-      </p:sp>
-      <p:sp>
-        <p:nvSpPr>
-          <p:cNvPr id="7" name="TextBox 6"/>
-          <p:cNvSpPr txBox="1"/>
-          <p:nvPr/>
-        </p:nvSpPr>
-        <p:spPr>
-          <a:xfrm>
-            <a:off x="2460624" y="5851723"/>
-            <a:ext cx="7818435" cy="369332"/>
-          </a:xfrm>
-          <a:prstGeom prst="rect">
-            <a:avLst/>
-          </a:prstGeom>
-          <a:noFill/>
-        </p:spPr>
-        <p:txBody>
-          <a:bodyPr wrap="square" rtlCol="0">
-            <a:spAutoFit/>
-          </a:bodyPr>
-          <a:lstStyle/>
-          <a:p>
-            <a:r>
-              <a:rPr lang="en-US" smtClean="0"/>
-              <a:t>Website hyperlink</a:t>
-            </a:r>
-            <a:endParaRPr lang="en-US"/>
-          </a:p>
-        </p:txBody>
-      </p:sp>
-      <p:sp>
-        <p:nvSpPr>
-          <p:cNvPr id="10" name="Content Placeholder 2"/>
-          <p:cNvSpPr>
-            <a:spLocks noGrp="1"/>
-          </p:cNvSpPr>
-          <p:nvPr>
-            <p:ph idx="1"/>
-          </p:nvPr>
-        </p:nvSpPr>
-        <p:spPr>
-          <a:xfrm>
-            <a:off x="2460624" y="1743074"/>
-            <a:ext cx="8915400" cy="3777622"/>
-          </a:xfrm>
-        </p:spPr>
-        <p:txBody>
-          <a:bodyPr>
-            <a:normAutofit/>
-          </a:bodyPr>
-          <a:lstStyle/>
-          <a:p>
-            <a:pPr marL="285750" indent="-285750">
-              <a:buFont typeface="Arial" charset="0"/>
-              <a:buChar char="•"/>
-            </a:pPr>
-            <a:r>
-              <a:rPr lang="en-US" sz="2800" dirty="0" err="1" smtClean="0"/>
-              <a:t>abc</a:t>
-            </a:r>
-            <a:endParaRPr lang="en-US" sz="2800" dirty="0"/>
-          </a:p>
-        </p:txBody>
-      </p:sp>
-    </p:spTree>
-    <p:extLst>
-      <p:ext uri="{BB962C8B-B14F-4D97-AF65-F5344CB8AC3E}">
-        <p14:creationId xmlns:p14="http://schemas.microsoft.com/office/powerpoint/2010/main" val="1158968325"/>
-      </p:ext>
-    </p:extLst>
-  </p:cSld>
-  <p:clrMapOvr>
-    <a:masterClrMapping/>
-  </p:clrMapOvr>
-  <mc:AlternateContent xmlns:mc="http://schemas.openxmlformats.org/markup-compatibility/2006">
-    <mc:Choice xmlns:p14="http://schemas.microsoft.com/office/powerpoint/2010/main" Requires="p14">
-      <p:transition spd="med" p14:dur="700">
-        <p:fade/>
-      </p:transition>
-    </mc:Choice>
-    <mc:Fallback>
-      <p:transition spd="med">
-        <p:fade/>
-      </p:transition>
-    </mc:Fallback>
-  </mc:AlternateContent>
-  <p:timing>
-    <p:tnLst>
-      <p:par>
-        <p:cTn id="1" dur="indefinite" restart="never" nodeType="tmRoot"/>
-      </p:par>
-    </p:tnLst>
-  </p:timing>
-</p:sld>
-</file>
-
-<file path=ppt/slides/slide6.xml><?xml version="1.0" encoding="utf-8"?>
-<p:sld xmlns:a="http://schemas.openxmlformats.org/drawingml/2006/main" xmlns:r="http://schemas.openxmlformats.org/officeDocument/2006/relationships" xmlns:p="http://schemas.openxmlformats.org/presentationml/2006/main">
-  <p:cSld>
-    <p:spTree>
-      <p:nvGrpSpPr>
-        <p:cNvPr id="1" name=""/>
-        <p:cNvGrpSpPr/>
-        <p:nvPr/>
-      </p:nvGrpSpPr>
-      <p:grpSpPr>
-        <a:xfrm>
-          <a:off x="0" y="0"/>
-          <a:ext cx="0" cy="0"/>
-          <a:chOff x="0" y="0"/>
-          <a:chExt cx="0" cy="0"/>
-        </a:xfrm>
-      </p:grpSpPr>
       <p:sp>
         <p:nvSpPr>
           <p:cNvPr id="3" name="Content Placeholder 2"/>
@@ -9226,6 +8904,20 @@
               <a:buFont typeface="Arial" charset="0"/>
               <a:buChar char="•"/>
             </a:pPr>
+            <a:r>
+              <a:rPr lang="en-US" sz="2800" dirty="0" smtClean="0"/>
+              <a:t>Firebase</a:t>
+            </a:r>
+          </a:p>
+          <a:p>
+            <a:pPr marL="285750" indent="-285750">
+              <a:buFont typeface="Arial" charset="0"/>
+              <a:buChar char="•"/>
+            </a:pPr>
+            <a:r>
+              <a:rPr lang="en-US" sz="2800" dirty="0" err="1" smtClean="0"/>
+              <a:t>Heroku</a:t>
+            </a:r>
             <a:endParaRPr lang="en-US" sz="2800" dirty="0"/>
           </a:p>
         </p:txBody>
@@ -9356,6 +9048,66 @@
           </a:prstGeom>
         </p:spPr>
       </p:pic>
+      <p:pic>
+        <p:nvPicPr>
+          <p:cNvPr id="2" name="Picture 1"/>
+          <p:cNvPicPr>
+            <a:picLocks noChangeAspect="1"/>
+          </p:cNvPicPr>
+          <p:nvPr/>
+        </p:nvPicPr>
+        <p:blipFill>
+          <a:blip r:embed="rId5">
+            <a:extLst>
+              <a:ext uri="{28A0092B-C50C-407E-A947-70E740481C1C}">
+                <a14:useLocalDpi xmlns:a14="http://schemas.microsoft.com/office/drawing/2010/main" val="0"/>
+              </a:ext>
+            </a:extLst>
+          </a:blip>
+          <a:stretch>
+            <a:fillRect/>
+          </a:stretch>
+        </p:blipFill>
+        <p:spPr>
+          <a:xfrm>
+            <a:off x="9729787" y="4523514"/>
+            <a:ext cx="2032000" cy="491399"/>
+          </a:xfrm>
+          <a:prstGeom prst="rect">
+            <a:avLst/>
+          </a:prstGeom>
+        </p:spPr>
+      </p:pic>
+      <p:pic>
+        <p:nvPicPr>
+          <p:cNvPr id="4" name="Picture 3"/>
+          <p:cNvPicPr>
+            <a:picLocks noChangeAspect="1"/>
+          </p:cNvPicPr>
+          <p:nvPr/>
+        </p:nvPicPr>
+        <p:blipFill>
+          <a:blip r:embed="rId6">
+            <a:extLst>
+              <a:ext uri="{28A0092B-C50C-407E-A947-70E740481C1C}">
+                <a14:useLocalDpi xmlns:a14="http://schemas.microsoft.com/office/drawing/2010/main" val="0"/>
+              </a:ext>
+            </a:extLst>
+          </a:blip>
+          <a:stretch>
+            <a:fillRect/>
+          </a:stretch>
+        </p:blipFill>
+        <p:spPr>
+          <a:xfrm>
+            <a:off x="9729787" y="5365964"/>
+            <a:ext cx="2032000" cy="711200"/>
+          </a:xfrm>
+          <a:prstGeom prst="rect">
+            <a:avLst/>
+          </a:prstGeom>
+        </p:spPr>
+      </p:pic>
     </p:spTree>
     <p:extLst>
       <p:ext uri="{BB962C8B-B14F-4D97-AF65-F5344CB8AC3E}">
@@ -9366,13 +9118,452 @@
   <p:clrMapOvr>
     <a:masterClrMapping/>
   </p:clrMapOvr>
-  <mc:AlternateContent xmlns:mc="http://schemas.openxmlformats.org/markup-compatibility/2006">
-    <mc:Choice xmlns:p14="http://schemas.microsoft.com/office/powerpoint/2010/main" Requires="p14">
+  <mc:AlternateContent xmlns:mc="http://schemas.openxmlformats.org/markup-compatibility/2006" xmlns:p14="http://schemas.microsoft.com/office/powerpoint/2010/main">
+    <mc:Choice Requires="p14">
       <p:transition spd="med" p14:dur="700">
         <p:fade/>
       </p:transition>
     </mc:Choice>
-    <mc:Fallback>
+    <mc:Fallback xmlns="">
+      <p:transition spd="med">
+        <p:fade/>
+      </p:transition>
+    </mc:Fallback>
+  </mc:AlternateContent>
+  <p:timing>
+    <p:tnLst>
+      <p:par>
+        <p:cTn id="1" dur="indefinite" restart="never" nodeType="tmRoot"/>
+      </p:par>
+    </p:tnLst>
+  </p:timing>
+</p:sld>
+</file>
+
+<file path=ppt/slides/slide5.xml><?xml version="1.0" encoding="utf-8"?>
+<p:sld xmlns:a="http://schemas.openxmlformats.org/drawingml/2006/main" xmlns:r="http://schemas.openxmlformats.org/officeDocument/2006/relationships" xmlns:p="http://schemas.openxmlformats.org/presentationml/2006/main">
+  <p:cSld>
+    <p:spTree>
+      <p:nvGrpSpPr>
+        <p:cNvPr id="1" name=""/>
+        <p:cNvGrpSpPr/>
+        <p:nvPr/>
+      </p:nvGrpSpPr>
+      <p:grpSpPr>
+        <a:xfrm>
+          <a:off x="0" y="0"/>
+          <a:ext cx="0" cy="0"/>
+          <a:chOff x="0" y="0"/>
+          <a:chExt cx="0" cy="0"/>
+        </a:xfrm>
+      </p:grpSpPr>
+      <p:pic>
+        <p:nvPicPr>
+          <p:cNvPr id="4" name="Picture 3"/>
+          <p:cNvPicPr>
+            <a:picLocks noChangeAspect="1"/>
+          </p:cNvPicPr>
+          <p:nvPr/>
+        </p:nvPicPr>
+        <p:blipFill>
+          <a:blip r:embed="rId2">
+            <a:extLst>
+              <a:ext uri="{28A0092B-C50C-407E-A947-70E740481C1C}">
+                <a14:useLocalDpi xmlns:a14="http://schemas.microsoft.com/office/drawing/2010/main" val="0"/>
+              </a:ext>
+            </a:extLst>
+          </a:blip>
+          <a:stretch>
+            <a:fillRect/>
+          </a:stretch>
+        </p:blipFill>
+        <p:spPr>
+          <a:xfrm>
+            <a:off x="9975848" y="195252"/>
+            <a:ext cx="1882777" cy="881204"/>
+          </a:xfrm>
+          <a:prstGeom prst="rect">
+            <a:avLst/>
+          </a:prstGeom>
+        </p:spPr>
+      </p:pic>
+      <p:sp>
+        <p:nvSpPr>
+          <p:cNvPr id="5" name="TextBox 4"/>
+          <p:cNvSpPr txBox="1"/>
+          <p:nvPr/>
+        </p:nvSpPr>
+        <p:spPr>
+          <a:xfrm>
+            <a:off x="1771651" y="657225"/>
+            <a:ext cx="3857624" cy="707886"/>
+          </a:xfrm>
+          <a:prstGeom prst="rect">
+            <a:avLst/>
+          </a:prstGeom>
+          <a:noFill/>
+        </p:spPr>
+        <p:txBody>
+          <a:bodyPr wrap="square" rtlCol="0">
+            <a:spAutoFit/>
+          </a:bodyPr>
+          <a:lstStyle/>
+          <a:p>
+            <a:r>
+              <a:rPr lang="en-US" sz="4000" smtClean="0"/>
+              <a:t>Functionality</a:t>
+            </a:r>
+            <a:endParaRPr lang="en-US" sz="4000" dirty="0"/>
+          </a:p>
+        </p:txBody>
+      </p:sp>
+      <p:sp>
+        <p:nvSpPr>
+          <p:cNvPr id="6" name="TextBox 5"/>
+          <p:cNvSpPr txBox="1"/>
+          <p:nvPr/>
+        </p:nvSpPr>
+        <p:spPr>
+          <a:xfrm>
+            <a:off x="1771651" y="4978324"/>
+            <a:ext cx="3857624" cy="707886"/>
+          </a:xfrm>
+          <a:prstGeom prst="rect">
+            <a:avLst/>
+          </a:prstGeom>
+          <a:noFill/>
+        </p:spPr>
+        <p:txBody>
+          <a:bodyPr wrap="square" rtlCol="0">
+            <a:spAutoFit/>
+          </a:bodyPr>
+          <a:lstStyle/>
+          <a:p>
+            <a:r>
+              <a:rPr lang="en-US" sz="4000" dirty="0" smtClean="0"/>
+              <a:t>Demo</a:t>
+            </a:r>
+            <a:endParaRPr lang="en-US" sz="4000" dirty="0"/>
+          </a:p>
+        </p:txBody>
+      </p:sp>
+      <p:sp>
+        <p:nvSpPr>
+          <p:cNvPr id="7" name="TextBox 6"/>
+          <p:cNvSpPr txBox="1"/>
+          <p:nvPr/>
+        </p:nvSpPr>
+        <p:spPr>
+          <a:xfrm>
+            <a:off x="2460624" y="5851723"/>
+            <a:ext cx="7818435" cy="369332"/>
+          </a:xfrm>
+          <a:prstGeom prst="rect">
+            <a:avLst/>
+          </a:prstGeom>
+          <a:noFill/>
+        </p:spPr>
+        <p:txBody>
+          <a:bodyPr wrap="square" rtlCol="0">
+            <a:spAutoFit/>
+          </a:bodyPr>
+          <a:lstStyle/>
+          <a:p>
+            <a:r>
+              <a:rPr lang="en-US" dirty="0" smtClean="0">
+                <a:hlinkClick r:id="rId3" action="ppaction://hlinkfile"/>
+              </a:rPr>
+              <a:t>Website hyperlink</a:t>
+            </a:r>
+            <a:endParaRPr lang="en-US" dirty="0"/>
+          </a:p>
+        </p:txBody>
+      </p:sp>
+      <p:sp>
+        <p:nvSpPr>
+          <p:cNvPr id="10" name="Content Placeholder 2"/>
+          <p:cNvSpPr>
+            <a:spLocks noGrp="1"/>
+          </p:cNvSpPr>
+          <p:nvPr>
+            <p:ph idx="1"/>
+          </p:nvPr>
+        </p:nvSpPr>
+        <p:spPr>
+          <a:xfrm>
+            <a:off x="2460624" y="1743074"/>
+            <a:ext cx="8915400" cy="3777622"/>
+          </a:xfrm>
+        </p:spPr>
+        <p:txBody>
+          <a:bodyPr>
+            <a:normAutofit/>
+          </a:bodyPr>
+          <a:lstStyle/>
+          <a:p>
+            <a:pPr>
+              <a:buFont typeface="Wingdings" charset="2"/>
+              <a:buChar char="Ø"/>
+            </a:pPr>
+            <a:r>
+              <a:rPr lang="en-US" sz="2800" dirty="0" err="1" smtClean="0"/>
+              <a:t>Ospry</a:t>
+            </a:r>
+            <a:r>
+              <a:rPr lang="en-US" sz="2800" dirty="0" smtClean="0"/>
+              <a:t> API</a:t>
+            </a:r>
+          </a:p>
+          <a:p>
+            <a:pPr>
+              <a:buFont typeface="Wingdings" charset="2"/>
+              <a:buChar char="Ø"/>
+            </a:pPr>
+            <a:r>
+              <a:rPr lang="en-US" sz="2800" dirty="0" smtClean="0"/>
+              <a:t>Face Plus Plus API</a:t>
+            </a:r>
+          </a:p>
+          <a:p>
+            <a:pPr>
+              <a:buFont typeface="Wingdings" charset="2"/>
+              <a:buChar char="Ø"/>
+            </a:pPr>
+            <a:r>
+              <a:rPr lang="en-US" sz="2800" dirty="0" smtClean="0"/>
+              <a:t>Firebase </a:t>
+            </a:r>
+          </a:p>
+          <a:p>
+            <a:pPr>
+              <a:buFont typeface="Wingdings" charset="2"/>
+              <a:buChar char="Ø"/>
+            </a:pPr>
+            <a:r>
+              <a:rPr lang="en-US" sz="2800" dirty="0" smtClean="0"/>
+              <a:t>Spotify API &amp; TMDB API</a:t>
+            </a:r>
+          </a:p>
+          <a:p>
+            <a:pPr>
+              <a:buFont typeface="Wingdings" charset="2"/>
+              <a:buChar char="Ø"/>
+            </a:pPr>
+            <a:r>
+              <a:rPr lang="en-US" sz="2800" dirty="0" err="1" smtClean="0"/>
+              <a:t>Heroku</a:t>
+            </a:r>
+            <a:endParaRPr lang="en-US" sz="2800" dirty="0" smtClean="0"/>
+          </a:p>
+          <a:p>
+            <a:pPr>
+              <a:buFont typeface="Wingdings" charset="2"/>
+              <a:buChar char="Ø"/>
+            </a:pPr>
+            <a:endParaRPr lang="en-US" sz="2800" dirty="0"/>
+          </a:p>
+        </p:txBody>
+      </p:sp>
+    </p:spTree>
+    <p:extLst>
+      <p:ext uri="{BB962C8B-B14F-4D97-AF65-F5344CB8AC3E}">
+        <p14:creationId xmlns:p14="http://schemas.microsoft.com/office/powerpoint/2010/main" val="1158968325"/>
+      </p:ext>
+    </p:extLst>
+  </p:cSld>
+  <p:clrMapOvr>
+    <a:masterClrMapping/>
+  </p:clrMapOvr>
+  <mc:AlternateContent xmlns:mc="http://schemas.openxmlformats.org/markup-compatibility/2006" xmlns:p14="http://schemas.microsoft.com/office/powerpoint/2010/main">
+    <mc:Choice Requires="p14">
+      <p:transition spd="med" p14:dur="700">
+        <p:fade/>
+      </p:transition>
+    </mc:Choice>
+    <mc:Fallback xmlns="">
+      <p:transition spd="med">
+        <p:fade/>
+      </p:transition>
+    </mc:Fallback>
+  </mc:AlternateContent>
+  <p:timing>
+    <p:tnLst>
+      <p:par>
+        <p:cTn id="1" dur="indefinite" restart="never" nodeType="tmRoot"/>
+      </p:par>
+    </p:tnLst>
+  </p:timing>
+</p:sld>
+</file>
+
+<file path=ppt/slides/slide6.xml><?xml version="1.0" encoding="utf-8"?>
+<p:sld xmlns:a="http://schemas.openxmlformats.org/drawingml/2006/main" xmlns:r="http://schemas.openxmlformats.org/officeDocument/2006/relationships" xmlns:p="http://schemas.openxmlformats.org/presentationml/2006/main">
+  <p:cSld>
+    <p:spTree>
+      <p:nvGrpSpPr>
+        <p:cNvPr id="1" name=""/>
+        <p:cNvGrpSpPr/>
+        <p:nvPr/>
+      </p:nvGrpSpPr>
+      <p:grpSpPr>
+        <a:xfrm>
+          <a:off x="0" y="0"/>
+          <a:ext cx="0" cy="0"/>
+          <a:chOff x="0" y="0"/>
+          <a:chExt cx="0" cy="0"/>
+        </a:xfrm>
+      </p:grpSpPr>
+      <p:pic>
+        <p:nvPicPr>
+          <p:cNvPr id="4" name="Picture 3"/>
+          <p:cNvPicPr>
+            <a:picLocks noChangeAspect="1"/>
+          </p:cNvPicPr>
+          <p:nvPr/>
+        </p:nvPicPr>
+        <p:blipFill>
+          <a:blip r:embed="rId2">
+            <a:extLst>
+              <a:ext uri="{28A0092B-C50C-407E-A947-70E740481C1C}">
+                <a14:useLocalDpi xmlns:a14="http://schemas.microsoft.com/office/drawing/2010/main" val="0"/>
+              </a:ext>
+            </a:extLst>
+          </a:blip>
+          <a:stretch>
+            <a:fillRect/>
+          </a:stretch>
+        </p:blipFill>
+        <p:spPr>
+          <a:xfrm>
+            <a:off x="9975848" y="195252"/>
+            <a:ext cx="1882777" cy="881204"/>
+          </a:xfrm>
+          <a:prstGeom prst="rect">
+            <a:avLst/>
+          </a:prstGeom>
+        </p:spPr>
+      </p:pic>
+      <p:sp>
+        <p:nvSpPr>
+          <p:cNvPr id="5" name="TextBox 4"/>
+          <p:cNvSpPr txBox="1"/>
+          <p:nvPr/>
+        </p:nvSpPr>
+        <p:spPr>
+          <a:xfrm>
+            <a:off x="1771650" y="657225"/>
+            <a:ext cx="3600449" cy="707886"/>
+          </a:xfrm>
+          <a:prstGeom prst="rect">
+            <a:avLst/>
+          </a:prstGeom>
+          <a:noFill/>
+        </p:spPr>
+        <p:txBody>
+          <a:bodyPr wrap="square" rtlCol="0">
+            <a:spAutoFit/>
+          </a:bodyPr>
+          <a:lstStyle/>
+          <a:p>
+            <a:r>
+              <a:rPr lang="en-US" sz="4000" smtClean="0"/>
+              <a:t>Future Plans</a:t>
+            </a:r>
+            <a:endParaRPr lang="en-US" sz="4000" dirty="0"/>
+          </a:p>
+        </p:txBody>
+      </p:sp>
+      <p:sp>
+        <p:nvSpPr>
+          <p:cNvPr id="8" name="Content Placeholder 2"/>
+          <p:cNvSpPr>
+            <a:spLocks noGrp="1"/>
+          </p:cNvSpPr>
+          <p:nvPr>
+            <p:ph idx="1"/>
+          </p:nvPr>
+        </p:nvSpPr>
+        <p:spPr>
+          <a:xfrm>
+            <a:off x="2460624" y="1743074"/>
+            <a:ext cx="8915400" cy="3777622"/>
+          </a:xfrm>
+        </p:spPr>
+        <p:txBody>
+          <a:bodyPr>
+            <a:normAutofit/>
+          </a:bodyPr>
+          <a:lstStyle/>
+          <a:p>
+            <a:pPr marL="285750" indent="-285750">
+              <a:buFont typeface="Arial" charset="0"/>
+              <a:buChar char="•"/>
+            </a:pPr>
+            <a:r>
+              <a:rPr lang="en-US" sz="2800" dirty="0" smtClean="0"/>
+              <a:t>Facial Recognition Software instead API</a:t>
+            </a:r>
+          </a:p>
+          <a:p>
+            <a:pPr marL="285750" indent="-285750">
+              <a:buFont typeface="Arial" charset="0"/>
+              <a:buChar char="•"/>
+            </a:pPr>
+            <a:r>
+              <a:rPr lang="en-US" sz="2800" dirty="0" smtClean="0"/>
+              <a:t>Active Camera (uploading directly from mobile)</a:t>
+            </a:r>
+          </a:p>
+          <a:p>
+            <a:pPr marL="285750" indent="-285750">
+              <a:buFont typeface="Arial" charset="0"/>
+              <a:buChar char="•"/>
+            </a:pPr>
+            <a:r>
+              <a:rPr lang="en-US" sz="2800" dirty="0" smtClean="0"/>
+              <a:t>Moment tracker</a:t>
+            </a:r>
+          </a:p>
+          <a:p>
+            <a:pPr marL="285750" indent="-285750">
+              <a:buFont typeface="Arial" charset="0"/>
+              <a:buChar char="•"/>
+            </a:pPr>
+            <a:r>
+              <a:rPr lang="en-US" sz="2800" dirty="0" smtClean="0"/>
+              <a:t>Suggestion for entertainment and activities for lifestyle enhancement</a:t>
+            </a:r>
+          </a:p>
+          <a:p>
+            <a:pPr marL="285750" indent="-285750">
+              <a:buFont typeface="Arial" charset="0"/>
+              <a:buChar char="•"/>
+            </a:pPr>
+            <a:r>
+              <a:rPr lang="en-US" sz="2800" dirty="0" smtClean="0"/>
+              <a:t>Deployment to health services industry</a:t>
+            </a:r>
+            <a:endParaRPr lang="en-US" sz="2800" dirty="0"/>
+          </a:p>
+        </p:txBody>
+      </p:sp>
+    </p:spTree>
+    <p:extLst>
+      <p:ext uri="{BB962C8B-B14F-4D97-AF65-F5344CB8AC3E}">
+        <p14:creationId xmlns:p14="http://schemas.microsoft.com/office/powerpoint/2010/main" val="2144241462"/>
+      </p:ext>
+    </p:extLst>
+  </p:cSld>
+  <p:clrMapOvr>
+    <a:masterClrMapping/>
+  </p:clrMapOvr>
+  <mc:AlternateContent xmlns:mc="http://schemas.openxmlformats.org/markup-compatibility/2006" xmlns:p14="http://schemas.microsoft.com/office/powerpoint/2010/main">
+    <mc:Choice Requires="p14">
+      <p:transition spd="med" p14:dur="700">
+        <p:fade/>
+      </p:transition>
+    </mc:Choice>
+    <mc:Fallback xmlns="">
       <p:transition spd="med">
         <p:fade/>
       </p:transition>
@@ -9427,149 +9618,6 @@
         </p:blipFill>
         <p:spPr>
           <a:xfrm>
-            <a:off x="9975848" y="195252"/>
-            <a:ext cx="1882777" cy="881204"/>
-          </a:xfrm>
-          <a:prstGeom prst="rect">
-            <a:avLst/>
-          </a:prstGeom>
-        </p:spPr>
-      </p:pic>
-      <p:sp>
-        <p:nvSpPr>
-          <p:cNvPr id="5" name="TextBox 4"/>
-          <p:cNvSpPr txBox="1"/>
-          <p:nvPr/>
-        </p:nvSpPr>
-        <p:spPr>
-          <a:xfrm>
-            <a:off x="1771650" y="657225"/>
-            <a:ext cx="3600449" cy="707886"/>
-          </a:xfrm>
-          <a:prstGeom prst="rect">
-            <a:avLst/>
-          </a:prstGeom>
-          <a:noFill/>
-        </p:spPr>
-        <p:txBody>
-          <a:bodyPr wrap="square" rtlCol="0">
-            <a:spAutoFit/>
-          </a:bodyPr>
-          <a:lstStyle/>
-          <a:p>
-            <a:r>
-              <a:rPr lang="en-US" sz="4000" smtClean="0"/>
-              <a:t>Future Plans</a:t>
-            </a:r>
-            <a:endParaRPr lang="en-US" sz="4000" dirty="0"/>
-          </a:p>
-        </p:txBody>
-      </p:sp>
-      <p:sp>
-        <p:nvSpPr>
-          <p:cNvPr id="8" name="Content Placeholder 2"/>
-          <p:cNvSpPr>
-            <a:spLocks noGrp="1"/>
-          </p:cNvSpPr>
-          <p:nvPr>
-            <p:ph idx="1"/>
-          </p:nvPr>
-        </p:nvSpPr>
-        <p:spPr>
-          <a:xfrm>
-            <a:off x="2460624" y="1743074"/>
-            <a:ext cx="8915400" cy="3777622"/>
-          </a:xfrm>
-        </p:spPr>
-        <p:txBody>
-          <a:bodyPr>
-            <a:normAutofit/>
-          </a:bodyPr>
-          <a:lstStyle/>
-          <a:p>
-            <a:pPr marL="285750" indent="-285750">
-              <a:buFont typeface="Arial" charset="0"/>
-              <a:buChar char="•"/>
-            </a:pPr>
-            <a:r>
-              <a:rPr lang="en-US" sz="2800" dirty="0" err="1" smtClean="0"/>
-              <a:t>abc</a:t>
-            </a:r>
-            <a:endParaRPr lang="en-US" sz="2800" dirty="0"/>
-          </a:p>
-        </p:txBody>
-      </p:sp>
-    </p:spTree>
-    <p:extLst>
-      <p:ext uri="{BB962C8B-B14F-4D97-AF65-F5344CB8AC3E}">
-        <p14:creationId xmlns:p14="http://schemas.microsoft.com/office/powerpoint/2010/main" val="2144241462"/>
-      </p:ext>
-    </p:extLst>
-  </p:cSld>
-  <p:clrMapOvr>
-    <a:masterClrMapping/>
-  </p:clrMapOvr>
-  <mc:AlternateContent xmlns:mc="http://schemas.openxmlformats.org/markup-compatibility/2006">
-    <mc:Choice xmlns:p14="http://schemas.microsoft.com/office/powerpoint/2010/main" Requires="p14">
-      <p:transition spd="med" p14:dur="700">
-        <p:fade/>
-      </p:transition>
-    </mc:Choice>
-    <mc:Fallback>
-      <p:transition spd="med">
-        <p:fade/>
-      </p:transition>
-    </mc:Fallback>
-  </mc:AlternateContent>
-  <p:timing>
-    <p:tnLst>
-      <p:par>
-        <p:cTn id="1" dur="indefinite" restart="never" nodeType="tmRoot"/>
-      </p:par>
-    </p:tnLst>
-  </p:timing>
-</p:sld>
-</file>
-
-<file path=ppt/slides/slide8.xml><?xml version="1.0" encoding="utf-8"?>
-<p:sld xmlns:a="http://schemas.openxmlformats.org/drawingml/2006/main" xmlns:r="http://schemas.openxmlformats.org/officeDocument/2006/relationships" xmlns:p="http://schemas.openxmlformats.org/presentationml/2006/main">
-  <p:cSld>
-    <p:spTree>
-      <p:nvGrpSpPr>
-        <p:cNvPr id="1" name=""/>
-        <p:cNvGrpSpPr/>
-        <p:nvPr/>
-      </p:nvGrpSpPr>
-      <p:grpSpPr>
-        <a:xfrm>
-          <a:off x="0" y="0"/>
-          <a:ext cx="0" cy="0"/>
-          <a:chOff x="0" y="0"/>
-          <a:chExt cx="0" cy="0"/>
-        </a:xfrm>
-      </p:grpSpPr>
-      <p:pic>
-        <p:nvPicPr>
-          <p:cNvPr id="4" name="Picture 3"/>
-          <p:cNvPicPr>
-            <a:picLocks noChangeAspect="1"/>
-          </p:cNvPicPr>
-          <p:nvPr/>
-        </p:nvPicPr>
-        <p:blipFill>
-          <a:blip r:embed="rId2">
-            <a:extLst>
-              <a:ext uri="{28A0092B-C50C-407E-A947-70E740481C1C}">
-                <a14:useLocalDpi xmlns:a14="http://schemas.microsoft.com/office/drawing/2010/main" val="0"/>
-              </a:ext>
-            </a:extLst>
-          </a:blip>
-          <a:stretch>
-            <a:fillRect/>
-          </a:stretch>
-        </p:blipFill>
-        <p:spPr>
-          <a:xfrm>
             <a:off x="2328862" y="2071687"/>
             <a:ext cx="7692707" cy="3600450"/>
           </a:xfrm>
@@ -9625,13 +9673,13 @@
   <p:clrMapOvr>
     <a:masterClrMapping/>
   </p:clrMapOvr>
-  <mc:AlternateContent xmlns:mc="http://schemas.openxmlformats.org/markup-compatibility/2006">
-    <mc:Choice xmlns:p14="http://schemas.microsoft.com/office/powerpoint/2010/main" Requires="p14">
+  <mc:AlternateContent xmlns:mc="http://schemas.openxmlformats.org/markup-compatibility/2006" xmlns:p14="http://schemas.microsoft.com/office/powerpoint/2010/main">
+    <mc:Choice Requires="p14">
       <p:transition spd="med" p14:dur="700">
         <p:fade/>
       </p:transition>
     </mc:Choice>
-    <mc:Fallback>
+    <mc:Fallback xmlns="">
       <p:transition spd="med">
         <p:fade/>
       </p:transition>

</xml_diff>